<commit_message>
cập nhật file báo cáo
thiết kế giao diện XONG
</commit_message>
<xml_diff>
--- a/Other/Prototype/Prototype Model pp.pptx
+++ b/Other/Prototype/Prototype Model pp.pptx
@@ -480,7 +480,7 @@
           <a:p>
             <a:fld id="{048613E9-AFCA-4E58-9085-5AD31D644CEE}" type="datetimeFigureOut">
               <a:rPr lang="en-US" smtClean="0"/>
-              <a:t>15/05/2018</a:t>
+              <a:t>20/05/2018</a:t>
             </a:fld>
             <a:endParaRPr lang="en-US"/>
           </a:p>
@@ -727,7 +727,7 @@
           <a:p>
             <a:fld id="{048613E9-AFCA-4E58-9085-5AD31D644CEE}" type="datetimeFigureOut">
               <a:rPr lang="en-US" smtClean="0"/>
-              <a:t>15/05/2018</a:t>
+              <a:t>20/05/2018</a:t>
             </a:fld>
             <a:endParaRPr lang="en-US"/>
           </a:p>
@@ -1113,7 +1113,7 @@
           <a:p>
             <a:fld id="{048613E9-AFCA-4E58-9085-5AD31D644CEE}" type="datetimeFigureOut">
               <a:rPr lang="en-US" smtClean="0"/>
-              <a:t>15/05/2018</a:t>
+              <a:t>20/05/2018</a:t>
             </a:fld>
             <a:endParaRPr lang="en-US"/>
           </a:p>
@@ -1342,7 +1342,7 @@
           <a:p>
             <a:fld id="{048613E9-AFCA-4E58-9085-5AD31D644CEE}" type="datetimeFigureOut">
               <a:rPr lang="en-US" smtClean="0"/>
-              <a:t>15/05/2018</a:t>
+              <a:t>20/05/2018</a:t>
             </a:fld>
             <a:endParaRPr lang="en-US"/>
           </a:p>
@@ -1825,7 +1825,7 @@
           <a:p>
             <a:fld id="{048613E9-AFCA-4E58-9085-5AD31D644CEE}" type="datetimeFigureOut">
               <a:rPr lang="en-US" smtClean="0"/>
-              <a:t>15/05/2018</a:t>
+              <a:t>20/05/2018</a:t>
             </a:fld>
             <a:endParaRPr lang="en-US"/>
           </a:p>
@@ -2135,7 +2135,7 @@
           <a:p>
             <a:fld id="{048613E9-AFCA-4E58-9085-5AD31D644CEE}" type="datetimeFigureOut">
               <a:rPr lang="en-US" smtClean="0"/>
-              <a:t>15/05/2018</a:t>
+              <a:t>20/05/2018</a:t>
             </a:fld>
             <a:endParaRPr lang="en-US"/>
           </a:p>
@@ -2531,7 +2531,7 @@
           <a:p>
             <a:fld id="{048613E9-AFCA-4E58-9085-5AD31D644CEE}" type="datetimeFigureOut">
               <a:rPr lang="en-US" smtClean="0"/>
-              <a:t>15/05/2018</a:t>
+              <a:t>20/05/2018</a:t>
             </a:fld>
             <a:endParaRPr lang="en-US"/>
           </a:p>
@@ -2654,7 +2654,7 @@
           <a:p>
             <a:fld id="{048613E9-AFCA-4E58-9085-5AD31D644CEE}" type="datetimeFigureOut">
               <a:rPr lang="en-US" smtClean="0"/>
-              <a:t>15/05/2018</a:t>
+              <a:t>20/05/2018</a:t>
             </a:fld>
             <a:endParaRPr lang="en-US"/>
           </a:p>
@@ -2749,7 +2749,7 @@
           <a:p>
             <a:fld id="{048613E9-AFCA-4E58-9085-5AD31D644CEE}" type="datetimeFigureOut">
               <a:rPr lang="en-US" smtClean="0"/>
-              <a:t>15/05/2018</a:t>
+              <a:t>20/05/2018</a:t>
             </a:fld>
             <a:endParaRPr lang="en-US"/>
           </a:p>
@@ -3049,7 +3049,7 @@
           <a:p>
             <a:fld id="{048613E9-AFCA-4E58-9085-5AD31D644CEE}" type="datetimeFigureOut">
               <a:rPr lang="en-US" smtClean="0"/>
-              <a:t>15/05/2018</a:t>
+              <a:t>20/05/2018</a:t>
             </a:fld>
             <a:endParaRPr lang="en-US"/>
           </a:p>
@@ -3319,7 +3319,7 @@
           <a:p>
             <a:fld id="{048613E9-AFCA-4E58-9085-5AD31D644CEE}" type="datetimeFigureOut">
               <a:rPr lang="en-US" smtClean="0"/>
-              <a:t>15/05/2018</a:t>
+              <a:t>20/05/2018</a:t>
             </a:fld>
             <a:endParaRPr lang="en-US"/>
           </a:p>
@@ -3734,7 +3734,7 @@
           <a:p>
             <a:fld id="{048613E9-AFCA-4E58-9085-5AD31D644CEE}" type="datetimeFigureOut">
               <a:rPr lang="en-US" smtClean="0"/>
-              <a:t>15/05/2018</a:t>
+              <a:t>20/05/2018</a:t>
             </a:fld>
             <a:endParaRPr lang="en-US"/>
           </a:p>
@@ -4261,11 +4261,7 @@
           <a:p>
             <a:r>
               <a:rPr lang="en-US" smtClean="0"/>
-              <a:t>PrototypE </a:t>
-            </a:r>
-            <a:r>
-              <a:rPr lang="en-US" smtClean="0"/>
-              <a:t>Model</a:t>
+              <a:t>PrototypE Model</a:t>
             </a:r>
             <a:endParaRPr lang="en-US"/>
           </a:p>
@@ -4281,14 +4277,72 @@
             <p:ph type="subTitle" idx="1"/>
           </p:nvPr>
         </p:nvSpPr>
-        <p:spPr/>
-        <p:txBody>
-          <a:bodyPr/>
-          <a:lstStyle/>
-          <a:p>
-            <a:r>
-              <a:rPr lang="en-US" smtClean="0"/>
-              <a:t>Nhóm 17 - tên</a:t>
+        <p:spPr>
+          <a:xfrm>
+            <a:off x="1088914" y="4490720"/>
+            <a:ext cx="3787886" cy="1753561"/>
+          </a:xfrm>
+        </p:spPr>
+        <p:txBody>
+          <a:bodyPr>
+            <a:normAutofit fontScale="92500" lnSpcReduction="20000"/>
+          </a:bodyPr>
+          <a:lstStyle/>
+          <a:p>
+            <a:r>
+              <a:rPr lang="en-US" smtClean="0"/>
+              <a:t>– </a:t>
+            </a:r>
+            <a:r>
+              <a:rPr lang="en-US"/>
+              <a:t>Nhóm </a:t>
+            </a:r>
+            <a:r>
+              <a:rPr lang="en-US" smtClean="0"/>
+              <a:t>17 </a:t>
+            </a:r>
+            <a:r>
+              <a:rPr lang="en-US" smtClean="0"/>
+              <a:t>–</a:t>
+            </a:r>
+          </a:p>
+          <a:p>
+            <a:endParaRPr lang="en-US" smtClean="0"/>
+          </a:p>
+          <a:p>
+            <a:r>
+              <a:rPr lang="en-US"/>
+              <a:t>Lê Văn </a:t>
+            </a:r>
+            <a:r>
+              <a:rPr lang="en-US"/>
+              <a:t>Pa </a:t>
+            </a:r>
+            <a:r>
+              <a:rPr lang="en-US" smtClean="0"/>
+              <a:t>	– </a:t>
+            </a:r>
+            <a:r>
+              <a:rPr lang="en-US"/>
+              <a:t>15520596</a:t>
+            </a:r>
+          </a:p>
+          <a:p>
+            <a:r>
+              <a:rPr lang="en-US" smtClean="0"/>
+              <a:t>Trịnh Gia  Thanh 	– 15520806</a:t>
+            </a:r>
+          </a:p>
+          <a:p>
+            <a:r>
+              <a:rPr lang="en-US" smtClean="0"/>
+              <a:t>Nguyễn Đức Tuấn 	– 16521546</a:t>
+            </a:r>
+          </a:p>
+          <a:p>
+            <a:r>
+              <a:rPr lang="en-US" smtClean="0"/>
+              <a:t>Trương Văn Nhất 	– 16521759</a:t>
             </a:r>
             <a:endParaRPr lang="en-US"/>
           </a:p>
@@ -4603,13 +4657,16 @@
           <a:p>
             <a:r>
               <a:rPr lang="fr-FR" sz="3000" smtClean="0"/>
-              <a:t>Là một mô hình trong qui trình </a:t>
+              <a:t>Là một mô hình trong </a:t>
             </a:r>
             <a:r>
               <a:rPr lang="fr-FR" sz="3000" smtClean="0"/>
-              <a:t>thiết kế</a:t>
-            </a:r>
-            <a:endParaRPr lang="fr-FR" sz="3000" smtClean="0"/>
+              <a:t>quá </a:t>
+            </a:r>
+            <a:r>
+              <a:rPr lang="fr-FR" sz="3000" smtClean="0"/>
+              <a:t>trình thiết kế</a:t>
+            </a:r>
           </a:p>
           <a:p>
             <a:r>
@@ -4668,17 +4725,16 @@
           <a:p>
             <a:r>
               <a:rPr lang="en-US" sz="3000" smtClean="0"/>
-              <a:t>Thường </a:t>
+              <a:t>Các prototype t</a:t>
             </a:r>
             <a:r>
               <a:rPr lang="en-US" sz="3000" smtClean="0"/>
-              <a:t>được làm nhanh trong thời gian </a:t>
+              <a:t>hường </a:t>
             </a:r>
             <a:r>
               <a:rPr lang="en-US" sz="3000" smtClean="0"/>
-              <a:t>ngắn, làm nhiều lần</a:t>
-            </a:r>
-            <a:endParaRPr lang="en-US" sz="3000" smtClean="0"/>
+              <a:t>được làm nhanh trong thời gian ngắn, làm nhiều lần</a:t>
+            </a:r>
           </a:p>
           <a:p>
             <a:endParaRPr lang="en-US"/>
@@ -4774,41 +4830,19 @@
           <a:p>
             <a:r>
               <a:rPr lang="en-US" sz="3000" smtClean="0"/>
-              <a:t>Trực quan sinh động, </a:t>
-            </a:r>
+              <a:t>Trực quan sinh động, đơn giản dễ hiểu</a:t>
+            </a:r>
+          </a:p>
+          <a:p>
             <a:r>
               <a:rPr lang="en-US" sz="3000" smtClean="0"/>
-              <a:t>đơn giản dễ hiểu</a:t>
-            </a:r>
-            <a:endParaRPr lang="en-US" sz="3000" smtClean="0"/>
+              <a:t>Làm rõ hơn phần đặc tả</a:t>
+            </a:r>
           </a:p>
           <a:p>
             <a:r>
               <a:rPr lang="en-US" sz="3000" smtClean="0"/>
-              <a:t>Làm rõ hơn phần đặc </a:t>
-            </a:r>
-            <a:r>
-              <a:rPr lang="en-US" sz="3000" smtClean="0"/>
-              <a:t>tả</a:t>
-            </a:r>
-            <a:endParaRPr lang="en-US" sz="3000" smtClean="0"/>
-          </a:p>
-          <a:p>
-            <a:r>
-              <a:rPr lang="en-US" sz="3000" smtClean="0"/>
-              <a:t>Phát hiện </a:t>
-            </a:r>
-            <a:r>
-              <a:rPr lang="en-US" sz="3000" smtClean="0"/>
-              <a:t>lỗi hay chức năng bị thiếu </a:t>
-            </a:r>
-            <a:r>
-              <a:rPr lang="en-US" sz="3000" smtClean="0"/>
-              <a:t>và khắc phục từ </a:t>
-            </a:r>
-            <a:r>
-              <a:rPr lang="en-US" sz="3000" smtClean="0"/>
-              <a:t>sớm</a:t>
+              <a:t>Phát hiện lỗi hay chức năng bị thiếu và khắc phục từ sớm</a:t>
             </a:r>
           </a:p>
           <a:p>
@@ -4816,7 +4850,6 @@
               <a:rPr lang="en-US" sz="3000" smtClean="0"/>
               <a:t>Rút ngắn giai đoạn phát triển (deployment)</a:t>
             </a:r>
-            <a:endParaRPr lang="en-US" sz="3000" smtClean="0"/>
           </a:p>
         </p:txBody>
       </p:sp>
@@ -4925,26 +4958,17 @@
             </a:r>
             <a:r>
               <a:rPr lang="en-US" sz="3000"/>
-              <a:t>kéo dài quá trình </a:t>
-            </a:r>
-            <a:r>
-              <a:rPr lang="en-US" sz="3000"/>
-              <a:t>thiết </a:t>
+              <a:t>kéo dài quá trình thiết </a:t>
             </a:r>
             <a:r>
               <a:rPr lang="en-US" sz="3000" smtClean="0"/>
               <a:t>kế</a:t>
             </a:r>
-            <a:endParaRPr lang="en-US" sz="3000" smtClean="0"/>
           </a:p>
           <a:p>
             <a:r>
               <a:rPr lang="en-US" sz="3000" smtClean="0"/>
-              <a:t>Lãng </a:t>
-            </a:r>
-            <a:r>
-              <a:rPr lang="en-US" sz="3000" smtClean="0"/>
-              <a:t>phí</a:t>
+              <a:t>Lãng phí</a:t>
             </a:r>
           </a:p>
         </p:txBody>
@@ -5071,7 +5095,6 @@
               <a:rPr lang="en-US" sz="3000" smtClean="0"/>
               <a:t>Axure RP</a:t>
             </a:r>
-            <a:endParaRPr lang="en-US" sz="3000" smtClean="0"/>
           </a:p>
           <a:p>
             <a:endParaRPr lang="en-US" sz="3000" smtClean="0"/>

</xml_diff>